<commit_message>
Datei befehle.go verbindet mit Datei goprojekt.go
</commit_message>
<xml_diff>
--- a/Meilensteinplanung.pptx
+++ b/Meilensteinplanung.pptx
@@ -207,7 +207,7 @@
           <a:p>
             <a:fld id="{703E22D0-69DB-4AD2-BFDB-B6B0697DB30B}" type="datetimeFigureOut">
               <a:rPr lang="de-DE" smtClean="0"/>
-              <a:t>17.11.2022</a:t>
+              <a:t>18.11.2022</a:t>
             </a:fld>
             <a:endParaRPr lang="de-DE" dirty="0"/>
           </a:p>
@@ -372,7 +372,7 @@
           <a:p>
             <a:fld id="{92D0A2B6-884F-47F1-97D4-56FF4241B1BC}" type="datetimeFigureOut">
               <a:rPr lang="de-DE" smtClean="0"/>
-              <a:t>17.11.2022</a:t>
+              <a:t>18.11.2022</a:t>
             </a:fld>
             <a:endParaRPr lang="de-DE" dirty="0"/>
           </a:p>
@@ -1054,7 +1054,7 @@
             <a:pPr rtl="0"/>
             <a:fld id="{6A53FAFE-A8FF-49BF-8B95-C1A5C14FF84D}" type="datetime1">
               <a:rPr lang="de-DE" noProof="0" smtClean="0"/>
-              <a:t>17.11.2022</a:t>
+              <a:t>18.11.2022</a:t>
             </a:fld>
             <a:endParaRPr lang="de-DE" noProof="0" dirty="0"/>
           </a:p>
@@ -1246,7 +1246,7 @@
             <a:pPr rtl="0"/>
             <a:fld id="{A5DA952A-262B-4C09-82C5-587247F1B81B}" type="datetime1">
               <a:rPr lang="de-DE" noProof="0" smtClean="0"/>
-              <a:t>17.11.2022</a:t>
+              <a:t>18.11.2022</a:t>
             </a:fld>
             <a:endParaRPr lang="de-DE" noProof="0" dirty="0"/>
           </a:p>
@@ -1623,7 +1623,7 @@
             <a:pPr rtl="0"/>
             <a:fld id="{CF005D64-4B99-448C-A713-09FA5439052A}" type="datetime1">
               <a:rPr lang="de-DE" noProof="0" smtClean="0"/>
-              <a:t>17.11.2022</a:t>
+              <a:t>18.11.2022</a:t>
             </a:fld>
             <a:endParaRPr lang="de-DE" noProof="0" dirty="0"/>
           </a:p>
@@ -1882,7 +1882,7 @@
             <a:pPr rtl="0"/>
             <a:fld id="{6229FE05-7231-43BE-B847-3AFA4A19CBAA}" type="datetime1">
               <a:rPr lang="de-DE" noProof="0" smtClean="0"/>
-              <a:t>17.11.2022</a:t>
+              <a:t>18.11.2022</a:t>
             </a:fld>
             <a:endParaRPr lang="de-DE" noProof="0" dirty="0"/>
           </a:p>
@@ -2283,7 +2283,7 @@
             <a:pPr rtl="0"/>
             <a:fld id="{5B53D26F-6680-425F-97AB-0E8697BD65E2}" type="datetime1">
               <a:rPr lang="de-DE" noProof="0" smtClean="0"/>
-              <a:t>17.11.2022</a:t>
+              <a:t>18.11.2022</a:t>
             </a:fld>
             <a:endParaRPr lang="de-DE" noProof="0" dirty="0"/>
           </a:p>
@@ -2423,7 +2423,7 @@
             <a:pPr rtl="0"/>
             <a:fld id="{5DA3ECD2-F655-4F1D-98E0-52599BF52BCA}" type="datetime1">
               <a:rPr lang="de-DE" noProof="0" smtClean="0"/>
-              <a:t>17.11.2022</a:t>
+              <a:t>18.11.2022</a:t>
             </a:fld>
             <a:endParaRPr lang="de-DE" noProof="0" dirty="0"/>
           </a:p>
@@ -2583,7 +2583,7 @@
             <a:pPr rtl="0"/>
             <a:fld id="{B48DB74F-2903-429A-9E94-EB396A414E9D}" type="datetime1">
               <a:rPr lang="de-DE" noProof="0" smtClean="0"/>
-              <a:t>17.11.2022</a:t>
+              <a:t>18.11.2022</a:t>
             </a:fld>
             <a:endParaRPr lang="de-DE" noProof="0" dirty="0"/>
           </a:p>
@@ -2916,7 +2916,7 @@
             <a:pPr rtl="0"/>
             <a:fld id="{CFA574F0-4503-424B-A28D-924B84ECEA2A}" type="datetime1">
               <a:rPr lang="de-DE" noProof="0" smtClean="0"/>
-              <a:t>17.11.2022</a:t>
+              <a:t>18.11.2022</a:t>
             </a:fld>
             <a:endParaRPr lang="de-DE" noProof="0" dirty="0"/>
           </a:p>
@@ -3271,7 +3271,7 @@
             <a:pPr rtl="0"/>
             <a:fld id="{93B6CE1F-19FD-43AD-A3FC-53284371392B}" type="datetime1">
               <a:rPr lang="de-DE" noProof="0" smtClean="0"/>
-              <a:t>17.11.2022</a:t>
+              <a:t>18.11.2022</a:t>
             </a:fld>
             <a:endParaRPr lang="de-DE" noProof="0" dirty="0"/>
           </a:p>
@@ -3533,7 +3533,7 @@
             <a:pPr rtl="0"/>
             <a:fld id="{5F6FD458-B8F2-4748-BB72-410F5C7102C5}" type="datetime1">
               <a:rPr lang="de-DE" noProof="0" smtClean="0"/>
-              <a:t>17.11.2022</a:t>
+              <a:t>18.11.2022</a:t>
             </a:fld>
             <a:endParaRPr lang="de-DE" noProof="0" dirty="0"/>
           </a:p>
@@ -5747,14 +5747,14 @@
             <p:ph idx="1"/>
             <p:extLst>
               <p:ext uri="{D42A27DB-BD31-4B8C-83A1-F6EECF244321}">
-                <p14:modId xmlns:p14="http://schemas.microsoft.com/office/powerpoint/2010/main" val="4123868156"/>
+                <p14:modId xmlns:p14="http://schemas.microsoft.com/office/powerpoint/2010/main" val="798858449"/>
               </p:ext>
             </p:extLst>
           </p:nvPr>
         </p:nvGraphicFramePr>
         <p:xfrm>
-          <a:off x="1096963" y="789723"/>
-          <a:ext cx="10058400" cy="5579912"/>
+          <a:off x="1096962" y="883976"/>
+          <a:ext cx="10352088" cy="6004560"/>
         </p:xfrm>
         <a:graphic>
           <a:graphicData uri="http://schemas.openxmlformats.org/drawingml/2006/table">
@@ -5763,14 +5763,14 @@
                 <a:tableStyleId>{00A15C55-8517-42AA-B614-E9B94910E393}</a:tableStyleId>
               </a:tblPr>
               <a:tblGrid>
-                <a:gridCol w="5029200">
+                <a:gridCol w="5176044">
                   <a:extLst>
                     <a:ext uri="{9D8B030D-6E8A-4147-A177-3AD203B41FA5}">
                       <a16:colId xmlns:a16="http://schemas.microsoft.com/office/drawing/2014/main" val="1963422835"/>
                     </a:ext>
                   </a:extLst>
                 </a:gridCol>
-                <a:gridCol w="5029200">
+                <a:gridCol w="5176044">
                   <a:extLst>
                     <a:ext uri="{9D8B030D-6E8A-4147-A177-3AD203B41FA5}">
                       <a16:colId xmlns:a16="http://schemas.microsoft.com/office/drawing/2014/main" val="1274141291"/>
@@ -5778,7 +5778,7 @@
                   </a:extLst>
                 </a:gridCol>
               </a:tblGrid>
-              <a:tr h="369829">
+              <a:tr h="173600">
                 <a:tc>
                   <a:txBody>
                     <a:bodyPr/>
@@ -5813,7 +5813,7 @@
                   </a:ext>
                 </a:extLst>
               </a:tr>
-              <a:tr h="786201">
+              <a:tr h="441234">
                 <a:tc>
                   <a:txBody>
                     <a:bodyPr/>
@@ -5884,7 +5884,7 @@
                   </a:ext>
                 </a:extLst>
               </a:tr>
-              <a:tr h="786201">
+              <a:tr h="361667">
                 <a:tc>
                   <a:txBody>
                     <a:bodyPr/>
@@ -5943,7 +5943,7 @@
                   </a:ext>
                 </a:extLst>
               </a:tr>
-              <a:tr h="369829">
+              <a:tr h="361667">
                 <a:tc>
                   <a:txBody>
                     <a:bodyPr/>
@@ -6057,12 +6057,12 @@
                         <a:t> </a:t>
                       </a:r>
                       <a:r>
-                        <a:rPr lang="de-DE" sz="1100" dirty="0" err="1">
+                        <a:rPr lang="de-DE" sz="1100">
                           <a:solidFill>
                             <a:schemeClr val="tx1"/>
                           </a:solidFill>
                         </a:rPr>
-                        <a:t>gefundenich</a:t>
+                        <a:t>gefunden.Ich</a:t>
                       </a:r>
                       <a:r>
                         <a:rPr lang="de-DE" sz="1100" dirty="0">
@@ -6145,18 +6145,13 @@
                         <a:t>path</a:t>
                       </a:r>
                       <a:r>
-                        <a:rPr lang="de-DE" sz="1100">
+                        <a:rPr lang="de-DE" sz="1100" dirty="0">
                           <a:solidFill>
                             <a:schemeClr val="tx1"/>
                           </a:solidFill>
                         </a:rPr>
                         <a:t>%„.</a:t>
                       </a:r>
-                      <a:endParaRPr lang="de-DE" sz="1100" dirty="0">
-                        <a:solidFill>
-                          <a:schemeClr val="tx1"/>
-                        </a:solidFill>
-                      </a:endParaRPr>
                     </a:p>
                   </a:txBody>
                   <a:tcPr anchor="ctr"/>
@@ -6167,7 +6162,7 @@
                   </a:ext>
                 </a:extLst>
               </a:tr>
-              <a:tr h="369829">
+              <a:tr h="282100">
                 <a:tc>
                   <a:txBody>
                     <a:bodyPr/>
@@ -6198,7 +6193,55 @@
                             <a:schemeClr val="tx1"/>
                           </a:solidFill>
                         </a:rPr>
-                        <a:t>Ich werde versuchen, alles in einer neuen Shell zu verwenden. </a:t>
+                        <a:t>Ich bin mit die Letze Funktion „</a:t>
+                      </a:r>
+                      <a:r>
+                        <a:rPr lang="de-DE" sz="1100" dirty="0" err="1">
+                          <a:solidFill>
+                            <a:schemeClr val="tx1"/>
+                          </a:solidFill>
+                        </a:rPr>
+                        <a:t>ls</a:t>
+                      </a:r>
+                      <a:r>
+                        <a:rPr lang="de-DE" sz="1100" dirty="0">
+                          <a:solidFill>
+                            <a:schemeClr val="tx1"/>
+                          </a:solidFill>
+                        </a:rPr>
+                        <a:t> –l“ auch fertig. Ich habe alles in einer neuen Shell installieren. Ich habe ein neue Repository im </a:t>
+                      </a:r>
+                      <a:r>
+                        <a:rPr lang="de-DE" sz="1100" dirty="0" err="1">
+                          <a:solidFill>
+                            <a:schemeClr val="tx1"/>
+                          </a:solidFill>
+                        </a:rPr>
+                        <a:t>Git</a:t>
+                      </a:r>
+                      <a:r>
+                        <a:rPr lang="de-DE" sz="1100" dirty="0">
+                          <a:solidFill>
+                            <a:schemeClr val="tx1"/>
+                          </a:solidFill>
+                        </a:rPr>
+                        <a:t> erstellen. Ich habe mit mein </a:t>
+                      </a:r>
+                      <a:r>
+                        <a:rPr lang="de-DE" sz="1100" dirty="0" err="1">
+                          <a:solidFill>
+                            <a:schemeClr val="tx1"/>
+                          </a:solidFill>
+                        </a:rPr>
+                        <a:t>Git</a:t>
+                      </a:r>
+                      <a:r>
+                        <a:rPr lang="de-DE" sz="1100" dirty="0">
+                          <a:solidFill>
+                            <a:schemeClr val="tx1"/>
+                          </a:solidFill>
+                        </a:rPr>
+                        <a:t> Repository meine ganze Dateien verbunden.</a:t>
                       </a:r>
                     </a:p>
                   </a:txBody>
@@ -6210,18 +6253,21 @@
                   </a:ext>
                 </a:extLst>
               </a:tr>
-              <a:tr h="369829">
+              <a:tr h="361667">
                 <a:tc>
                   <a:txBody>
                     <a:bodyPr/>
                     <a:lstStyle/>
                     <a:p>
                       <a:pPr algn="ctr"/>
-                      <a:endParaRPr lang="de-DE" sz="1800" dirty="0">
-                        <a:solidFill>
-                          <a:schemeClr val="tx1"/>
-                        </a:solidFill>
-                      </a:endParaRPr>
+                      <a:r>
+                        <a:rPr lang="de-DE" sz="1800" dirty="0">
+                          <a:solidFill>
+                            <a:schemeClr val="tx1"/>
+                          </a:solidFill>
+                        </a:rPr>
+                        <a:t>18.11.2022</a:t>
+                      </a:r>
                     </a:p>
                   </a:txBody>
                   <a:tcPr anchor="ctr"/>
@@ -6232,11 +6278,89 @@
                     <a:lstStyle/>
                     <a:p>
                       <a:pPr algn="ctr"/>
-                      <a:endParaRPr lang="de-DE" sz="1100" dirty="0">
-                        <a:solidFill>
-                          <a:schemeClr val="tx1"/>
-                        </a:solidFill>
-                      </a:endParaRPr>
+                      <a:r>
+                        <a:rPr lang="de-DE" sz="1100" dirty="0">
+                          <a:solidFill>
+                            <a:schemeClr val="tx1"/>
+                          </a:solidFill>
+                        </a:rPr>
+                        <a:t>Ich habe eine eigene Datei für die ganze Funktionen gemacht, heißt „</a:t>
+                      </a:r>
+                      <a:r>
+                        <a:rPr lang="de-DE" sz="1100" dirty="0" err="1">
+                          <a:solidFill>
+                            <a:schemeClr val="tx1"/>
+                          </a:solidFill>
+                        </a:rPr>
+                        <a:t>befehle.go</a:t>
+                      </a:r>
+                      <a:r>
+                        <a:rPr lang="de-DE" sz="1100" dirty="0">
+                          <a:solidFill>
+                            <a:schemeClr val="tx1"/>
+                          </a:solidFill>
+                        </a:rPr>
+                        <a:t>“.</a:t>
+                      </a:r>
+                    </a:p>
+                    <a:p>
+                      <a:pPr algn="ctr"/>
+                      <a:r>
+                        <a:rPr lang="de-DE" sz="1100" dirty="0">
+                          <a:solidFill>
+                            <a:schemeClr val="tx1"/>
+                          </a:solidFill>
+                        </a:rPr>
+                        <a:t>Ich habe Schwierigkeit zum mein Datei „</a:t>
+                      </a:r>
+                      <a:r>
+                        <a:rPr lang="de-DE" sz="1100" dirty="0" err="1">
+                          <a:solidFill>
+                            <a:schemeClr val="tx1"/>
+                          </a:solidFill>
+                        </a:rPr>
+                        <a:t>befehle.go</a:t>
+                      </a:r>
+                      <a:r>
+                        <a:rPr lang="de-DE" sz="1100" dirty="0">
+                          <a:solidFill>
+                            <a:schemeClr val="tx1"/>
+                          </a:solidFill>
+                        </a:rPr>
+                        <a:t>“ mit mein ganze Funktionen mit mein Main Datei „</a:t>
+                      </a:r>
+                      <a:r>
+                        <a:rPr lang="de-DE" sz="1100" dirty="0" err="1">
+                          <a:solidFill>
+                            <a:schemeClr val="tx1"/>
+                          </a:solidFill>
+                        </a:rPr>
+                        <a:t>goprojekt.go</a:t>
+                      </a:r>
+                      <a:r>
+                        <a:rPr lang="de-DE" sz="1100" dirty="0">
+                          <a:solidFill>
+                            <a:schemeClr val="tx1"/>
+                          </a:solidFill>
+                        </a:rPr>
+                        <a:t>“ verbunden. Kommt immer die Fehler „</a:t>
+                      </a:r>
+                      <a:r>
+                        <a:rPr lang="de-DE" sz="1100" dirty="0" err="1">
+                          <a:solidFill>
+                            <a:schemeClr val="tx1"/>
+                          </a:solidFill>
+                        </a:rPr>
+                        <a:t>undefined</a:t>
+                      </a:r>
+                      <a:r>
+                        <a:rPr lang="de-DE" sz="1100" dirty="0">
+                          <a:solidFill>
+                            <a:schemeClr val="tx1"/>
+                          </a:solidFill>
+                        </a:rPr>
+                        <a:t>“. Ich probiere heute dass lösen.</a:t>
+                      </a:r>
                     </a:p>
                   </a:txBody>
                   <a:tcPr anchor="ctr"/>
@@ -6247,7 +6371,7 @@
                   </a:ext>
                 </a:extLst>
               </a:tr>
-              <a:tr h="369829">
+              <a:tr h="173600">
                 <a:tc>
                   <a:txBody>
                     <a:bodyPr/>
@@ -6284,7 +6408,7 @@
                   </a:ext>
                 </a:extLst>
               </a:tr>
-              <a:tr h="369829">
+              <a:tr h="173600">
                 <a:tc>
                   <a:txBody>
                     <a:bodyPr/>
@@ -6321,7 +6445,7 @@
                   </a:ext>
                 </a:extLst>
               </a:tr>
-              <a:tr h="369829">
+              <a:tr h="173600">
                 <a:tc>
                   <a:txBody>
                     <a:bodyPr/>
@@ -6358,7 +6482,7 @@
                   </a:ext>
                 </a:extLst>
               </a:tr>
-              <a:tr h="369829">
+              <a:tr h="173600">
                 <a:tc>
                   <a:txBody>
                     <a:bodyPr/>
@@ -6395,7 +6519,7 @@
                   </a:ext>
                 </a:extLst>
               </a:tr>
-              <a:tr h="369829">
+              <a:tr h="173600">
                 <a:tc>
                   <a:txBody>
                     <a:bodyPr/>
@@ -7546,15 +7670,6 @@
 </file>
 
 <file path=customXml/item1.xml><?xml version="1.0" encoding="utf-8"?>
-<?mso-contentType ?>
-<FormTemplates xmlns="http://schemas.microsoft.com/sharepoint/v3/contenttype/forms">
-  <Display>DocumentLibraryForm</Display>
-  <Edit>DocumentLibraryForm</Edit>
-  <New>DocumentLibraryForm</New>
-</FormTemplates>
-</file>
-
-<file path=customXml/item2.xml><?xml version="1.0" encoding="utf-8"?>
 <p:properties xmlns:p="http://schemas.microsoft.com/office/2006/metadata/properties" xmlns:xsi="http://www.w3.org/2001/XMLSchema-instance" xmlns:pc="http://schemas.microsoft.com/office/infopath/2007/PartnerControls">
   <documentManagement>
     <Status xmlns="71af3243-3dd4-4a8d-8c0d-dd76da1f02a5">Not started</Status>
@@ -7563,7 +7678,7 @@
 </p:properties>
 </file>
 
-<file path=customXml/item3.xml><?xml version="1.0" encoding="utf-8"?>
+<file path=customXml/item2.xml><?xml version="1.0" encoding="utf-8"?>
 <ct:contentTypeSchema xmlns:ct="http://schemas.microsoft.com/office/2006/metadata/contentType" xmlns:ma="http://schemas.microsoft.com/office/2006/metadata/properties/metaAttributes" ct:_="" ma:_="" ma:contentTypeName="Document" ma:contentTypeID="0x01010079F111ED35F8CC479449609E8A0923A6" ma:contentTypeVersion="12" ma:contentTypeDescription="Create a new document." ma:contentTypeScope="" ma:versionID="a410dd7f93c95333ffa1b60ed6adedd1">
   <xsd:schema xmlns:xsd="http://www.w3.org/2001/XMLSchema" xmlns:xs="http://www.w3.org/2001/XMLSchema" xmlns:p="http://schemas.microsoft.com/office/2006/metadata/properties" xmlns:ns2="71af3243-3dd4-4a8d-8c0d-dd76da1f02a5" xmlns:ns3="16c05727-aa75-4e4a-9b5f-8a80a1165891" targetNamespace="http://schemas.microsoft.com/office/2006/metadata/properties" ma:root="true" ma:fieldsID="a936d9baba76aa3866493feff160faab" ns2:_="" ns3:_="">
     <xsd:import namespace="71af3243-3dd4-4a8d-8c0d-dd76da1f02a5"/>
@@ -7784,15 +7899,16 @@
 </ct:contentTypeSchema>
 </file>
 
-<file path=customXml/itemProps1.xml><?xml version="1.0" encoding="utf-8"?>
-<ds:datastoreItem xmlns:ds="http://schemas.openxmlformats.org/officeDocument/2006/customXml" ds:itemID="{AA3F7EDC-E5B4-4BBC-9D2A-CBE6D46C37AD}">
-  <ds:schemaRefs>
-    <ds:schemaRef ds:uri="http://schemas.microsoft.com/sharepoint/v3/contenttype/forms"/>
-  </ds:schemaRefs>
-</ds:datastoreItem>
+<file path=customXml/item3.xml><?xml version="1.0" encoding="utf-8"?>
+<?mso-contentType ?>
+<FormTemplates xmlns="http://schemas.microsoft.com/sharepoint/v3/contenttype/forms">
+  <Display>DocumentLibraryForm</Display>
+  <Edit>DocumentLibraryForm</Edit>
+  <New>DocumentLibraryForm</New>
+</FormTemplates>
 </file>
 
-<file path=customXml/itemProps2.xml><?xml version="1.0" encoding="utf-8"?>
+<file path=customXml/itemProps1.xml><?xml version="1.0" encoding="utf-8"?>
 <ds:datastoreItem xmlns:ds="http://schemas.openxmlformats.org/officeDocument/2006/customXml" ds:itemID="{A03EEFF0-FB57-4CB4-8BFC-DF397689E2ED}">
   <ds:schemaRefs>
     <ds:schemaRef ds:uri="http://schemas.microsoft.com/office/2006/metadata/properties"/>
@@ -7802,7 +7918,7 @@
 </ds:datastoreItem>
 </file>
 
-<file path=customXml/itemProps3.xml><?xml version="1.0" encoding="utf-8"?>
+<file path=customXml/itemProps2.xml><?xml version="1.0" encoding="utf-8"?>
 <ds:datastoreItem xmlns:ds="http://schemas.openxmlformats.org/officeDocument/2006/customXml" ds:itemID="{93932EF5-314F-409E-8020-FEE5FA0795B9}">
   <ds:schemaRefs>
     <ds:schemaRef ds:uri="http://schemas.microsoft.com/office/2006/metadata/contentType"/>
@@ -7819,4 +7935,12 @@
     <ds:schemaRef ds:uri="http://schemas.microsoft.com/internal/obd"/>
   </ds:schemaRefs>
 </ds:datastoreItem>
+</file>
+
+<file path=customXml/itemProps3.xml><?xml version="1.0" encoding="utf-8"?>
+<ds:datastoreItem xmlns:ds="http://schemas.openxmlformats.org/officeDocument/2006/customXml" ds:itemID="{AA3F7EDC-E5B4-4BBC-9D2A-CBE6D46C37AD}">
+  <ds:schemaRefs>
+    <ds:schemaRef ds:uri="http://schemas.microsoft.com/sharepoint/v3/contenttype/forms"/>
+  </ds:schemaRefs>
+</ds:datastoreItem>
 </file>
</xml_diff>